<commit_message>
Adding new size, finalizing format
</commit_message>
<xml_diff>
--- a/Presentations/Open Repositories 2015/ORCommunities35x28.pptx
+++ b/Presentations/Open Repositories 2015/ORCommunities35x28.pptx
@@ -193,7 +193,7 @@
           <a:p>
             <a:fld id="{70685992-2584-0D40-9F4F-6E4B59BEC887}" type="datetimeFigureOut">
               <a:rPr lang="en-US" smtClean="0"/>
-              <a:t>5/7/15</a:t>
+              <a:t>5/12/15</a:t>
             </a:fld>
             <a:endParaRPr lang="en-US"/>
           </a:p>
@@ -840,7 +840,7 @@
           <a:p>
             <a:fld id="{D968744C-CFB2-7D43-BF8E-20D9B6CB77D5}" type="datetimeFigureOut">
               <a:rPr lang="en-US" smtClean="0"/>
-              <a:t>5/7/15</a:t>
+              <a:t>5/12/15</a:t>
             </a:fld>
             <a:endParaRPr lang="en-US"/>
           </a:p>
@@ -1010,7 +1010,7 @@
           <a:p>
             <a:fld id="{D968744C-CFB2-7D43-BF8E-20D9B6CB77D5}" type="datetimeFigureOut">
               <a:rPr lang="en-US" smtClean="0"/>
-              <a:t>5/7/15</a:t>
+              <a:t>5/12/15</a:t>
             </a:fld>
             <a:endParaRPr lang="en-US"/>
           </a:p>
@@ -1190,7 +1190,7 @@
           <a:p>
             <a:fld id="{D968744C-CFB2-7D43-BF8E-20D9B6CB77D5}" type="datetimeFigureOut">
               <a:rPr lang="en-US" smtClean="0"/>
-              <a:t>5/7/15</a:t>
+              <a:t>5/12/15</a:t>
             </a:fld>
             <a:endParaRPr lang="en-US"/>
           </a:p>
@@ -1360,7 +1360,7 @@
           <a:p>
             <a:fld id="{D968744C-CFB2-7D43-BF8E-20D9B6CB77D5}" type="datetimeFigureOut">
               <a:rPr lang="en-US" smtClean="0"/>
-              <a:t>5/7/15</a:t>
+              <a:t>5/12/15</a:t>
             </a:fld>
             <a:endParaRPr lang="en-US"/>
           </a:p>
@@ -1606,7 +1606,7 @@
           <a:p>
             <a:fld id="{D968744C-CFB2-7D43-BF8E-20D9B6CB77D5}" type="datetimeFigureOut">
               <a:rPr lang="en-US" smtClean="0"/>
-              <a:t>5/7/15</a:t>
+              <a:t>5/12/15</a:t>
             </a:fld>
             <a:endParaRPr lang="en-US"/>
           </a:p>
@@ -1894,7 +1894,7 @@
           <a:p>
             <a:fld id="{D968744C-CFB2-7D43-BF8E-20D9B6CB77D5}" type="datetimeFigureOut">
               <a:rPr lang="en-US" smtClean="0"/>
-              <a:t>5/7/15</a:t>
+              <a:t>5/12/15</a:t>
             </a:fld>
             <a:endParaRPr lang="en-US"/>
           </a:p>
@@ -2316,7 +2316,7 @@
           <a:p>
             <a:fld id="{D968744C-CFB2-7D43-BF8E-20D9B6CB77D5}" type="datetimeFigureOut">
               <a:rPr lang="en-US" smtClean="0"/>
-              <a:t>5/7/15</a:t>
+              <a:t>5/12/15</a:t>
             </a:fld>
             <a:endParaRPr lang="en-US"/>
           </a:p>
@@ -2434,7 +2434,7 @@
           <a:p>
             <a:fld id="{D968744C-CFB2-7D43-BF8E-20D9B6CB77D5}" type="datetimeFigureOut">
               <a:rPr lang="en-US" smtClean="0"/>
-              <a:t>5/7/15</a:t>
+              <a:t>5/12/15</a:t>
             </a:fld>
             <a:endParaRPr lang="en-US"/>
           </a:p>
@@ -2529,7 +2529,7 @@
           <a:p>
             <a:fld id="{D968744C-CFB2-7D43-BF8E-20D9B6CB77D5}" type="datetimeFigureOut">
               <a:rPr lang="en-US" smtClean="0"/>
-              <a:t>5/7/15</a:t>
+              <a:t>5/12/15</a:t>
             </a:fld>
             <a:endParaRPr lang="en-US"/>
           </a:p>
@@ -2806,7 +2806,7 @@
           <a:p>
             <a:fld id="{D968744C-CFB2-7D43-BF8E-20D9B6CB77D5}" type="datetimeFigureOut">
               <a:rPr lang="en-US" smtClean="0"/>
-              <a:t>5/7/15</a:t>
+              <a:t>5/12/15</a:t>
             </a:fld>
             <a:endParaRPr lang="en-US"/>
           </a:p>
@@ -3059,7 +3059,7 @@
           <a:p>
             <a:fld id="{D968744C-CFB2-7D43-BF8E-20D9B6CB77D5}" type="datetimeFigureOut">
               <a:rPr lang="en-US" smtClean="0"/>
-              <a:t>5/7/15</a:t>
+              <a:t>5/12/15</a:t>
             </a:fld>
             <a:endParaRPr lang="en-US"/>
           </a:p>
@@ -3272,7 +3272,7 @@
           <a:p>
             <a:fld id="{D968744C-CFB2-7D43-BF8E-20D9B6CB77D5}" type="datetimeFigureOut">
               <a:rPr lang="en-US" smtClean="0"/>
-              <a:t>5/7/15</a:t>
+              <a:t>5/12/15</a:t>
             </a:fld>
             <a:endParaRPr lang="en-US"/>
           </a:p>
@@ -3835,7 +3835,7 @@
         <p:spPr>
           <a:xfrm>
             <a:off x="24552092" y="15394118"/>
-            <a:ext cx="6553441" cy="5004364"/>
+            <a:ext cx="6553441" cy="4796615"/>
           </a:xfrm>
           <a:prstGeom prst="rect">
             <a:avLst/>
@@ -3859,14 +3859,14 @@
               </a:lnSpc>
             </a:pPr>
             <a:r>
-              <a:rPr lang="en-US" sz="6000" b="1" dirty="0">
+              <a:rPr lang="en-US" sz="4500" b="1" dirty="0">
                 <a:latin typeface="Helvetica"/>
                 <a:cs typeface="Helvetica"/>
               </a:rPr>
               <a:t>About </a:t>
             </a:r>
             <a:r>
-              <a:rPr lang="en-US" sz="6000" b="1" dirty="0" smtClean="0">
+              <a:rPr lang="en-US" sz="4500" b="1" dirty="0" smtClean="0">
                 <a:latin typeface="Helvetica"/>
                 <a:cs typeface="Helvetica"/>
               </a:rPr>
@@ -4157,8 +4157,8 @@
         </p:nvSpPr>
         <p:spPr>
           <a:xfrm rot="5400000">
-            <a:off x="15642604" y="4868252"/>
-            <a:ext cx="612598" cy="32004000"/>
+            <a:off x="20662839" y="9351651"/>
+            <a:ext cx="612598" cy="21963530"/>
           </a:xfrm>
           <a:prstGeom prst="rect">
             <a:avLst/>
@@ -4426,7 +4426,7 @@
         </p:nvSpPr>
         <p:spPr>
           <a:xfrm rot="5400000">
-            <a:off x="18786459" y="12433126"/>
+            <a:off x="18991953" y="12438756"/>
             <a:ext cx="25597570" cy="731318"/>
           </a:xfrm>
           <a:prstGeom prst="rect">
@@ -5459,564 +5459,6 @@
               </a:rPr>
               <a:t>.</a:t>
             </a:r>
-            <a:endParaRPr lang="en-US" sz="3600" dirty="0">
-              <a:latin typeface="Helvetica"/>
-              <a:cs typeface="Helvetica"/>
-            </a:endParaRPr>
-          </a:p>
-        </p:txBody>
-      </p:sp>
-      <p:sp>
-        <p:nvSpPr>
-          <p:cNvPr id="36" name="TextBox 35"/>
-          <p:cNvSpPr txBox="1"/>
-          <p:nvPr/>
-        </p:nvSpPr>
-        <p:spPr>
-          <a:xfrm>
-            <a:off x="731311" y="15394118"/>
-            <a:ext cx="9256058" cy="5004364"/>
-          </a:xfrm>
-          <a:prstGeom prst="rect">
-            <a:avLst/>
-          </a:prstGeom>
-          <a:noFill/>
-          <a:ln w="28575" cmpd="sng">
-            <a:solidFill>
-              <a:schemeClr val="tx1"/>
-            </a:solidFill>
-          </a:ln>
-        </p:spPr>
-        <p:txBody>
-          <a:bodyPr wrap="square" lIns="329104" tIns="164551" rIns="329104" bIns="164551" rtlCol="0">
-            <a:spAutoFit/>
-          </a:bodyPr>
-          <a:lstStyle/>
-          <a:p>
-            <a:pPr>
-              <a:lnSpc>
-                <a:spcPct val="90000"/>
-              </a:lnSpc>
-            </a:pPr>
-            <a:r>
-              <a:rPr lang="en-US" sz="6000" b="1" dirty="0" smtClean="0">
-                <a:latin typeface="Helvetica"/>
-                <a:cs typeface="Helvetica"/>
-              </a:rPr>
-              <a:t>Advantages</a:t>
-            </a:r>
-          </a:p>
-          <a:p>
-            <a:pPr>
-              <a:lnSpc>
-                <a:spcPct val="90000"/>
-              </a:lnSpc>
-            </a:pPr>
-            <a:endParaRPr lang="en-US" sz="1400" dirty="0">
-              <a:latin typeface="Helvetica"/>
-              <a:cs typeface="Helvetica"/>
-            </a:endParaRPr>
-          </a:p>
-          <a:p>
-            <a:pPr marL="571500" indent="-571500">
-              <a:lnSpc>
-                <a:spcPct val="110000"/>
-              </a:lnSpc>
-              <a:buFont typeface="Arial"/>
-              <a:buChar char="•"/>
-            </a:pPr>
-            <a:r>
-              <a:rPr lang="en-US" sz="3600" dirty="0" err="1">
-                <a:latin typeface="Helvetica"/>
-                <a:cs typeface="Helvetica"/>
-              </a:rPr>
-              <a:t>adipiscing</a:t>
-            </a:r>
-            <a:r>
-              <a:rPr lang="en-US" sz="3600" dirty="0">
-                <a:latin typeface="Helvetica"/>
-                <a:cs typeface="Helvetica"/>
-              </a:rPr>
-              <a:t> </a:t>
-            </a:r>
-            <a:r>
-              <a:rPr lang="en-US" sz="3600" dirty="0" err="1">
-                <a:latin typeface="Helvetica"/>
-                <a:cs typeface="Helvetica"/>
-              </a:rPr>
-              <a:t>elit</a:t>
-            </a:r>
-            <a:r>
-              <a:rPr lang="en-US" sz="3600" dirty="0">
-                <a:latin typeface="Helvetica"/>
-                <a:cs typeface="Helvetica"/>
-              </a:rPr>
-              <a:t>, </a:t>
-            </a:r>
-            <a:r>
-              <a:rPr lang="en-US" sz="3600" dirty="0" err="1">
-                <a:latin typeface="Helvetica"/>
-                <a:cs typeface="Helvetica"/>
-              </a:rPr>
-              <a:t>sed</a:t>
-            </a:r>
-            <a:r>
-              <a:rPr lang="en-US" sz="3600" dirty="0">
-                <a:latin typeface="Helvetica"/>
-                <a:cs typeface="Helvetica"/>
-              </a:rPr>
-              <a:t> do </a:t>
-            </a:r>
-            <a:r>
-              <a:rPr lang="en-US" sz="3600" dirty="0" err="1">
-                <a:latin typeface="Helvetica"/>
-                <a:cs typeface="Helvetica"/>
-              </a:rPr>
-              <a:t>eiusmod</a:t>
-            </a:r>
-            <a:r>
-              <a:rPr lang="en-US" sz="3600" dirty="0">
-                <a:latin typeface="Helvetica"/>
-                <a:cs typeface="Helvetica"/>
-              </a:rPr>
-              <a:t> </a:t>
-            </a:r>
-            <a:r>
-              <a:rPr lang="en-US" sz="3600" dirty="0" err="1">
-                <a:latin typeface="Helvetica"/>
-                <a:cs typeface="Helvetica"/>
-              </a:rPr>
-              <a:t>tempor</a:t>
-            </a:r>
-            <a:r>
-              <a:rPr lang="en-US" sz="3600" dirty="0">
-                <a:latin typeface="Helvetica"/>
-                <a:cs typeface="Helvetica"/>
-              </a:rPr>
-              <a:t> </a:t>
-            </a:r>
-            <a:r>
-              <a:rPr lang="en-US" sz="3600" dirty="0" smtClean="0">
-                <a:latin typeface="Helvetica"/>
-                <a:cs typeface="Helvetica"/>
-              </a:rPr>
-              <a:t> </a:t>
-            </a:r>
-          </a:p>
-          <a:p>
-            <a:pPr marL="571500" indent="-571500">
-              <a:lnSpc>
-                <a:spcPct val="110000"/>
-              </a:lnSpc>
-              <a:buFont typeface="Arial"/>
-              <a:buChar char="•"/>
-            </a:pPr>
-            <a:r>
-              <a:rPr lang="en-US" sz="3600" dirty="0" err="1">
-                <a:latin typeface="Helvetica"/>
-                <a:cs typeface="Helvetica"/>
-              </a:rPr>
-              <a:t>adipiscing</a:t>
-            </a:r>
-            <a:r>
-              <a:rPr lang="en-US" sz="3600" dirty="0">
-                <a:latin typeface="Helvetica"/>
-                <a:cs typeface="Helvetica"/>
-              </a:rPr>
-              <a:t> </a:t>
-            </a:r>
-            <a:r>
-              <a:rPr lang="en-US" sz="3600" dirty="0" err="1">
-                <a:latin typeface="Helvetica"/>
-                <a:cs typeface="Helvetica"/>
-              </a:rPr>
-              <a:t>elit</a:t>
-            </a:r>
-            <a:r>
-              <a:rPr lang="en-US" sz="3600" dirty="0">
-                <a:latin typeface="Helvetica"/>
-                <a:cs typeface="Helvetica"/>
-              </a:rPr>
-              <a:t>, </a:t>
-            </a:r>
-            <a:r>
-              <a:rPr lang="en-US" sz="3600" dirty="0" err="1">
-                <a:latin typeface="Helvetica"/>
-                <a:cs typeface="Helvetica"/>
-              </a:rPr>
-              <a:t>sed</a:t>
-            </a:r>
-            <a:r>
-              <a:rPr lang="en-US" sz="3600" dirty="0">
-                <a:latin typeface="Helvetica"/>
-                <a:cs typeface="Helvetica"/>
-              </a:rPr>
-              <a:t> do </a:t>
-            </a:r>
-            <a:r>
-              <a:rPr lang="en-US" sz="3600" dirty="0" err="1">
-                <a:latin typeface="Helvetica"/>
-                <a:cs typeface="Helvetica"/>
-              </a:rPr>
-              <a:t>eiusmod</a:t>
-            </a:r>
-            <a:r>
-              <a:rPr lang="en-US" sz="3600" dirty="0">
-                <a:latin typeface="Helvetica"/>
-                <a:cs typeface="Helvetica"/>
-              </a:rPr>
-              <a:t> </a:t>
-            </a:r>
-            <a:r>
-              <a:rPr lang="en-US" sz="3600" dirty="0" err="1">
-                <a:latin typeface="Helvetica"/>
-                <a:cs typeface="Helvetica"/>
-              </a:rPr>
-              <a:t>tempor</a:t>
-            </a:r>
-            <a:r>
-              <a:rPr lang="en-US" sz="3600" dirty="0">
-                <a:latin typeface="Helvetica"/>
-                <a:cs typeface="Helvetica"/>
-              </a:rPr>
-              <a:t> </a:t>
-            </a:r>
-            <a:endParaRPr lang="en-US" sz="3600" dirty="0" smtClean="0">
-              <a:latin typeface="Helvetica"/>
-              <a:cs typeface="Helvetica"/>
-            </a:endParaRPr>
-          </a:p>
-          <a:p>
-            <a:pPr marL="571500" indent="-571500">
-              <a:lnSpc>
-                <a:spcPct val="110000"/>
-              </a:lnSpc>
-              <a:buFont typeface="Arial"/>
-              <a:buChar char="•"/>
-            </a:pPr>
-            <a:r>
-              <a:rPr lang="en-US" sz="3600" dirty="0" err="1">
-                <a:latin typeface="Helvetica"/>
-                <a:cs typeface="Helvetica"/>
-              </a:rPr>
-              <a:t>adipiscing</a:t>
-            </a:r>
-            <a:r>
-              <a:rPr lang="en-US" sz="3600" dirty="0">
-                <a:latin typeface="Helvetica"/>
-                <a:cs typeface="Helvetica"/>
-              </a:rPr>
-              <a:t> </a:t>
-            </a:r>
-            <a:r>
-              <a:rPr lang="en-US" sz="3600" dirty="0" err="1">
-                <a:latin typeface="Helvetica"/>
-                <a:cs typeface="Helvetica"/>
-              </a:rPr>
-              <a:t>elit</a:t>
-            </a:r>
-            <a:r>
-              <a:rPr lang="en-US" sz="3600" dirty="0">
-                <a:latin typeface="Helvetica"/>
-                <a:cs typeface="Helvetica"/>
-              </a:rPr>
-              <a:t>, </a:t>
-            </a:r>
-            <a:r>
-              <a:rPr lang="en-US" sz="3600" dirty="0" err="1">
-                <a:latin typeface="Helvetica"/>
-                <a:cs typeface="Helvetica"/>
-              </a:rPr>
-              <a:t>sed</a:t>
-            </a:r>
-            <a:r>
-              <a:rPr lang="en-US" sz="3600" dirty="0">
-                <a:latin typeface="Helvetica"/>
-                <a:cs typeface="Helvetica"/>
-              </a:rPr>
-              <a:t> do </a:t>
-            </a:r>
-            <a:r>
-              <a:rPr lang="en-US" sz="3600" dirty="0" err="1">
-                <a:latin typeface="Helvetica"/>
-                <a:cs typeface="Helvetica"/>
-              </a:rPr>
-              <a:t>eiusmod</a:t>
-            </a:r>
-            <a:r>
-              <a:rPr lang="en-US" sz="3600" dirty="0">
-                <a:latin typeface="Helvetica"/>
-                <a:cs typeface="Helvetica"/>
-              </a:rPr>
-              <a:t> </a:t>
-            </a:r>
-            <a:r>
-              <a:rPr lang="en-US" sz="3600" dirty="0" err="1">
-                <a:latin typeface="Helvetica"/>
-                <a:cs typeface="Helvetica"/>
-              </a:rPr>
-              <a:t>tempor</a:t>
-            </a:r>
-            <a:r>
-              <a:rPr lang="en-US" sz="3600" dirty="0">
-                <a:latin typeface="Helvetica"/>
-                <a:cs typeface="Helvetica"/>
-              </a:rPr>
-              <a:t> </a:t>
-            </a:r>
-            <a:endParaRPr lang="en-US" sz="3600" dirty="0" smtClean="0">
-              <a:latin typeface="Helvetica"/>
-              <a:cs typeface="Helvetica"/>
-            </a:endParaRPr>
-          </a:p>
-          <a:p>
-            <a:pPr marL="571500" indent="-571500">
-              <a:lnSpc>
-                <a:spcPct val="110000"/>
-              </a:lnSpc>
-              <a:buFont typeface="Arial"/>
-              <a:buChar char="•"/>
-            </a:pPr>
-            <a:r>
-              <a:rPr lang="en-US" sz="3600" dirty="0" err="1">
-                <a:latin typeface="Helvetica"/>
-                <a:cs typeface="Helvetica"/>
-              </a:rPr>
-              <a:t>adipiscing</a:t>
-            </a:r>
-            <a:r>
-              <a:rPr lang="en-US" sz="3600" dirty="0">
-                <a:latin typeface="Helvetica"/>
-                <a:cs typeface="Helvetica"/>
-              </a:rPr>
-              <a:t> </a:t>
-            </a:r>
-            <a:r>
-              <a:rPr lang="en-US" sz="3600" dirty="0" err="1">
-                <a:latin typeface="Helvetica"/>
-                <a:cs typeface="Helvetica"/>
-              </a:rPr>
-              <a:t>elit</a:t>
-            </a:r>
-            <a:r>
-              <a:rPr lang="en-US" sz="3600" dirty="0">
-                <a:latin typeface="Helvetica"/>
-                <a:cs typeface="Helvetica"/>
-              </a:rPr>
-              <a:t>, </a:t>
-            </a:r>
-            <a:r>
-              <a:rPr lang="en-US" sz="3600" dirty="0" err="1">
-                <a:latin typeface="Helvetica"/>
-                <a:cs typeface="Helvetica"/>
-              </a:rPr>
-              <a:t>sed</a:t>
-            </a:r>
-            <a:r>
-              <a:rPr lang="en-US" sz="3600" dirty="0">
-                <a:latin typeface="Helvetica"/>
-                <a:cs typeface="Helvetica"/>
-              </a:rPr>
-              <a:t> do </a:t>
-            </a:r>
-            <a:r>
-              <a:rPr lang="en-US" sz="3600" dirty="0" err="1">
-                <a:latin typeface="Helvetica"/>
-                <a:cs typeface="Helvetica"/>
-              </a:rPr>
-              <a:t>eiusmod</a:t>
-            </a:r>
-            <a:r>
-              <a:rPr lang="en-US" sz="3600" dirty="0">
-                <a:latin typeface="Helvetica"/>
-                <a:cs typeface="Helvetica"/>
-              </a:rPr>
-              <a:t> </a:t>
-            </a:r>
-            <a:r>
-              <a:rPr lang="en-US" sz="3600" dirty="0" err="1">
-                <a:latin typeface="Helvetica"/>
-                <a:cs typeface="Helvetica"/>
-              </a:rPr>
-              <a:t>tempor</a:t>
-            </a:r>
-            <a:r>
-              <a:rPr lang="en-US" sz="3600" dirty="0">
-                <a:latin typeface="Helvetica"/>
-                <a:cs typeface="Helvetica"/>
-              </a:rPr>
-              <a:t> </a:t>
-            </a:r>
-            <a:endParaRPr lang="en-US" sz="3600" dirty="0" smtClean="0">
-              <a:latin typeface="Helvetica"/>
-              <a:cs typeface="Helvetica"/>
-            </a:endParaRPr>
-          </a:p>
-          <a:p>
-            <a:pPr marL="571500" indent="-571500">
-              <a:lnSpc>
-                <a:spcPct val="110000"/>
-              </a:lnSpc>
-              <a:buFont typeface="Arial"/>
-              <a:buChar char="•"/>
-            </a:pPr>
-            <a:r>
-              <a:rPr lang="en-US" sz="3600" dirty="0" err="1">
-                <a:latin typeface="Helvetica"/>
-                <a:cs typeface="Helvetica"/>
-              </a:rPr>
-              <a:t>adipiscing</a:t>
-            </a:r>
-            <a:r>
-              <a:rPr lang="en-US" sz="3600" dirty="0">
-                <a:latin typeface="Helvetica"/>
-                <a:cs typeface="Helvetica"/>
-              </a:rPr>
-              <a:t> </a:t>
-            </a:r>
-            <a:r>
-              <a:rPr lang="en-US" sz="3600" dirty="0" err="1">
-                <a:latin typeface="Helvetica"/>
-                <a:cs typeface="Helvetica"/>
-              </a:rPr>
-              <a:t>elit</a:t>
-            </a:r>
-            <a:r>
-              <a:rPr lang="en-US" sz="3600" dirty="0">
-                <a:latin typeface="Helvetica"/>
-                <a:cs typeface="Helvetica"/>
-              </a:rPr>
-              <a:t>, </a:t>
-            </a:r>
-            <a:r>
-              <a:rPr lang="en-US" sz="3600" dirty="0" err="1">
-                <a:latin typeface="Helvetica"/>
-                <a:cs typeface="Helvetica"/>
-              </a:rPr>
-              <a:t>sed</a:t>
-            </a:r>
-            <a:r>
-              <a:rPr lang="en-US" sz="3600" dirty="0">
-                <a:latin typeface="Helvetica"/>
-                <a:cs typeface="Helvetica"/>
-              </a:rPr>
-              <a:t> do </a:t>
-            </a:r>
-            <a:r>
-              <a:rPr lang="en-US" sz="3600" dirty="0" err="1">
-                <a:latin typeface="Helvetica"/>
-                <a:cs typeface="Helvetica"/>
-              </a:rPr>
-              <a:t>eiusmod</a:t>
-            </a:r>
-            <a:r>
-              <a:rPr lang="en-US" sz="3600" dirty="0">
-                <a:latin typeface="Helvetica"/>
-                <a:cs typeface="Helvetica"/>
-              </a:rPr>
-              <a:t> </a:t>
-            </a:r>
-            <a:r>
-              <a:rPr lang="en-US" sz="3600" dirty="0" err="1">
-                <a:latin typeface="Helvetica"/>
-                <a:cs typeface="Helvetica"/>
-              </a:rPr>
-              <a:t>tempor</a:t>
-            </a:r>
-            <a:r>
-              <a:rPr lang="en-US" sz="3600" dirty="0">
-                <a:latin typeface="Helvetica"/>
-                <a:cs typeface="Helvetica"/>
-              </a:rPr>
-              <a:t> </a:t>
-            </a:r>
-            <a:endParaRPr lang="en-US" sz="3600" dirty="0" smtClean="0">
-              <a:latin typeface="Helvetica"/>
-              <a:cs typeface="Helvetica"/>
-            </a:endParaRPr>
-          </a:p>
-          <a:p>
-            <a:pPr marL="571500" indent="-571500">
-              <a:lnSpc>
-                <a:spcPct val="110000"/>
-              </a:lnSpc>
-              <a:buFont typeface="Arial"/>
-              <a:buChar char="•"/>
-            </a:pPr>
-            <a:r>
-              <a:rPr lang="en-US" sz="3600" dirty="0" err="1">
-                <a:latin typeface="Helvetica"/>
-                <a:cs typeface="Helvetica"/>
-              </a:rPr>
-              <a:t>adipiscing</a:t>
-            </a:r>
-            <a:r>
-              <a:rPr lang="en-US" sz="3600" dirty="0">
-                <a:latin typeface="Helvetica"/>
-                <a:cs typeface="Helvetica"/>
-              </a:rPr>
-              <a:t> </a:t>
-            </a:r>
-            <a:r>
-              <a:rPr lang="en-US" sz="3600" dirty="0" err="1">
-                <a:latin typeface="Helvetica"/>
-                <a:cs typeface="Helvetica"/>
-              </a:rPr>
-              <a:t>elit</a:t>
-            </a:r>
-            <a:r>
-              <a:rPr lang="en-US" sz="3600" dirty="0">
-                <a:latin typeface="Helvetica"/>
-                <a:cs typeface="Helvetica"/>
-              </a:rPr>
-              <a:t>, </a:t>
-            </a:r>
-            <a:r>
-              <a:rPr lang="en-US" sz="3600" dirty="0" err="1">
-                <a:latin typeface="Helvetica"/>
-                <a:cs typeface="Helvetica"/>
-              </a:rPr>
-              <a:t>sed</a:t>
-            </a:r>
-            <a:r>
-              <a:rPr lang="en-US" sz="3600" dirty="0">
-                <a:latin typeface="Helvetica"/>
-                <a:cs typeface="Helvetica"/>
-              </a:rPr>
-              <a:t> do </a:t>
-            </a:r>
-            <a:r>
-              <a:rPr lang="en-US" sz="3600" dirty="0" err="1">
-                <a:latin typeface="Helvetica"/>
-                <a:cs typeface="Helvetica"/>
-              </a:rPr>
-              <a:t>eiusmod</a:t>
-            </a:r>
-            <a:r>
-              <a:rPr lang="en-US" sz="3600" dirty="0">
-                <a:latin typeface="Helvetica"/>
-                <a:cs typeface="Helvetica"/>
-              </a:rPr>
-              <a:t> </a:t>
-            </a:r>
-            <a:r>
-              <a:rPr lang="en-US" sz="3600" dirty="0" err="1">
-                <a:latin typeface="Helvetica"/>
-                <a:cs typeface="Helvetica"/>
-              </a:rPr>
-              <a:t>tempor</a:t>
-            </a:r>
-            <a:r>
-              <a:rPr lang="en-US" sz="3600" dirty="0">
-                <a:latin typeface="Helvetica"/>
-                <a:cs typeface="Helvetica"/>
-              </a:rPr>
-              <a:t> </a:t>
-            </a:r>
-            <a:endParaRPr lang="en-US" sz="3600" dirty="0" smtClean="0">
-              <a:latin typeface="Helvetica"/>
-              <a:cs typeface="Helvetica"/>
-            </a:endParaRPr>
           </a:p>
         </p:txBody>
       </p:sp>
@@ -6042,8 +5484,8 @@
         </p:blipFill>
         <p:spPr>
           <a:xfrm>
-            <a:off x="10985500" y="6864236"/>
-            <a:ext cx="12568465" cy="11032064"/>
+            <a:off x="10985500" y="6157107"/>
+            <a:ext cx="12568465" cy="13870009"/>
           </a:xfrm>
           <a:prstGeom prst="rect">
             <a:avLst/>
@@ -6058,8 +5500,8 @@
         </p:nvSpPr>
         <p:spPr>
           <a:xfrm rot="5400000">
-            <a:off x="15848097" y="-1105695"/>
-            <a:ext cx="612598" cy="32004000"/>
+            <a:off x="5110070" y="9632331"/>
+            <a:ext cx="612599" cy="10527948"/>
           </a:xfrm>
           <a:prstGeom prst="rect">
             <a:avLst/>
@@ -6100,394 +5542,6 @@
       </p:sp>
       <p:sp>
         <p:nvSpPr>
-          <p:cNvPr id="40" name="TextBox 39"/>
-          <p:cNvSpPr txBox="1"/>
-          <p:nvPr/>
-        </p:nvSpPr>
-        <p:spPr>
-          <a:xfrm>
-            <a:off x="731311" y="21176551"/>
-            <a:ext cx="9256058" cy="3785568"/>
-          </a:xfrm>
-          <a:prstGeom prst="rect">
-            <a:avLst/>
-          </a:prstGeom>
-          <a:noFill/>
-          <a:ln w="28575" cmpd="sng">
-            <a:solidFill>
-              <a:schemeClr val="tx1"/>
-            </a:solidFill>
-          </a:ln>
-        </p:spPr>
-        <p:txBody>
-          <a:bodyPr wrap="square" lIns="329104" tIns="164551" rIns="329104" bIns="164551" rtlCol="0">
-            <a:spAutoFit/>
-          </a:bodyPr>
-          <a:lstStyle/>
-          <a:p>
-            <a:pPr>
-              <a:lnSpc>
-                <a:spcPct val="90000"/>
-              </a:lnSpc>
-            </a:pPr>
-            <a:r>
-              <a:rPr lang="en-US" sz="6000" b="1" dirty="0" smtClean="0">
-                <a:latin typeface="Helvetica"/>
-                <a:cs typeface="Helvetica"/>
-              </a:rPr>
-              <a:t>Disadvantages</a:t>
-            </a:r>
-          </a:p>
-          <a:p>
-            <a:pPr>
-              <a:lnSpc>
-                <a:spcPct val="90000"/>
-              </a:lnSpc>
-            </a:pPr>
-            <a:endParaRPr lang="en-US" sz="1400" dirty="0">
-              <a:latin typeface="Helvetica"/>
-              <a:cs typeface="Helvetica"/>
-            </a:endParaRPr>
-          </a:p>
-          <a:p>
-            <a:pPr marL="571500" indent="-571500">
-              <a:lnSpc>
-                <a:spcPct val="110000"/>
-              </a:lnSpc>
-              <a:buFont typeface="Arial"/>
-              <a:buChar char="•"/>
-            </a:pPr>
-            <a:r>
-              <a:rPr lang="en-US" sz="3600" dirty="0" err="1">
-                <a:latin typeface="Helvetica"/>
-                <a:cs typeface="Helvetica"/>
-              </a:rPr>
-              <a:t>adipiscing</a:t>
-            </a:r>
-            <a:r>
-              <a:rPr lang="en-US" sz="3600" dirty="0">
-                <a:latin typeface="Helvetica"/>
-                <a:cs typeface="Helvetica"/>
-              </a:rPr>
-              <a:t> </a:t>
-            </a:r>
-            <a:r>
-              <a:rPr lang="en-US" sz="3600" dirty="0" err="1">
-                <a:latin typeface="Helvetica"/>
-                <a:cs typeface="Helvetica"/>
-              </a:rPr>
-              <a:t>elit</a:t>
-            </a:r>
-            <a:r>
-              <a:rPr lang="en-US" sz="3600" dirty="0">
-                <a:latin typeface="Helvetica"/>
-                <a:cs typeface="Helvetica"/>
-              </a:rPr>
-              <a:t>, </a:t>
-            </a:r>
-            <a:r>
-              <a:rPr lang="en-US" sz="3600" dirty="0" err="1">
-                <a:latin typeface="Helvetica"/>
-                <a:cs typeface="Helvetica"/>
-              </a:rPr>
-              <a:t>sed</a:t>
-            </a:r>
-            <a:r>
-              <a:rPr lang="en-US" sz="3600" dirty="0">
-                <a:latin typeface="Helvetica"/>
-                <a:cs typeface="Helvetica"/>
-              </a:rPr>
-              <a:t> do </a:t>
-            </a:r>
-            <a:r>
-              <a:rPr lang="en-US" sz="3600" dirty="0" err="1">
-                <a:latin typeface="Helvetica"/>
-                <a:cs typeface="Helvetica"/>
-              </a:rPr>
-              <a:t>eiusmod</a:t>
-            </a:r>
-            <a:r>
-              <a:rPr lang="en-US" sz="3600" dirty="0">
-                <a:latin typeface="Helvetica"/>
-                <a:cs typeface="Helvetica"/>
-              </a:rPr>
-              <a:t> </a:t>
-            </a:r>
-            <a:r>
-              <a:rPr lang="en-US" sz="3600" dirty="0" err="1">
-                <a:latin typeface="Helvetica"/>
-                <a:cs typeface="Helvetica"/>
-              </a:rPr>
-              <a:t>tempor</a:t>
-            </a:r>
-            <a:r>
-              <a:rPr lang="en-US" sz="3600" dirty="0">
-                <a:latin typeface="Helvetica"/>
-                <a:cs typeface="Helvetica"/>
-              </a:rPr>
-              <a:t> </a:t>
-            </a:r>
-            <a:r>
-              <a:rPr lang="en-US" sz="3600" dirty="0" smtClean="0">
-                <a:latin typeface="Helvetica"/>
-                <a:cs typeface="Helvetica"/>
-              </a:rPr>
-              <a:t> </a:t>
-            </a:r>
-          </a:p>
-          <a:p>
-            <a:pPr marL="571500" indent="-571500">
-              <a:lnSpc>
-                <a:spcPct val="110000"/>
-              </a:lnSpc>
-              <a:buFont typeface="Arial"/>
-              <a:buChar char="•"/>
-            </a:pPr>
-            <a:r>
-              <a:rPr lang="en-US" sz="3600" dirty="0" err="1">
-                <a:latin typeface="Helvetica"/>
-                <a:cs typeface="Helvetica"/>
-              </a:rPr>
-              <a:t>adipiscing</a:t>
-            </a:r>
-            <a:r>
-              <a:rPr lang="en-US" sz="3600" dirty="0">
-                <a:latin typeface="Helvetica"/>
-                <a:cs typeface="Helvetica"/>
-              </a:rPr>
-              <a:t> </a:t>
-            </a:r>
-            <a:r>
-              <a:rPr lang="en-US" sz="3600" dirty="0" err="1">
-                <a:latin typeface="Helvetica"/>
-                <a:cs typeface="Helvetica"/>
-              </a:rPr>
-              <a:t>elit</a:t>
-            </a:r>
-            <a:r>
-              <a:rPr lang="en-US" sz="3600" dirty="0">
-                <a:latin typeface="Helvetica"/>
-                <a:cs typeface="Helvetica"/>
-              </a:rPr>
-              <a:t>, </a:t>
-            </a:r>
-            <a:r>
-              <a:rPr lang="en-US" sz="3600" dirty="0" err="1">
-                <a:latin typeface="Helvetica"/>
-                <a:cs typeface="Helvetica"/>
-              </a:rPr>
-              <a:t>sed</a:t>
-            </a:r>
-            <a:r>
-              <a:rPr lang="en-US" sz="3600" dirty="0">
-                <a:latin typeface="Helvetica"/>
-                <a:cs typeface="Helvetica"/>
-              </a:rPr>
-              <a:t> do </a:t>
-            </a:r>
-            <a:r>
-              <a:rPr lang="en-US" sz="3600" dirty="0" err="1">
-                <a:latin typeface="Helvetica"/>
-                <a:cs typeface="Helvetica"/>
-              </a:rPr>
-              <a:t>eiusmod</a:t>
-            </a:r>
-            <a:r>
-              <a:rPr lang="en-US" sz="3600" dirty="0">
-                <a:latin typeface="Helvetica"/>
-                <a:cs typeface="Helvetica"/>
-              </a:rPr>
-              <a:t> </a:t>
-            </a:r>
-            <a:r>
-              <a:rPr lang="en-US" sz="3600" dirty="0" err="1">
-                <a:latin typeface="Helvetica"/>
-                <a:cs typeface="Helvetica"/>
-              </a:rPr>
-              <a:t>tempor</a:t>
-            </a:r>
-            <a:r>
-              <a:rPr lang="en-US" sz="3600" dirty="0">
-                <a:latin typeface="Helvetica"/>
-                <a:cs typeface="Helvetica"/>
-              </a:rPr>
-              <a:t> </a:t>
-            </a:r>
-            <a:endParaRPr lang="en-US" sz="3600" dirty="0" smtClean="0">
-              <a:latin typeface="Helvetica"/>
-              <a:cs typeface="Helvetica"/>
-            </a:endParaRPr>
-          </a:p>
-          <a:p>
-            <a:pPr marL="571500" indent="-571500">
-              <a:lnSpc>
-                <a:spcPct val="110000"/>
-              </a:lnSpc>
-              <a:buFont typeface="Arial"/>
-              <a:buChar char="•"/>
-            </a:pPr>
-            <a:r>
-              <a:rPr lang="en-US" sz="3600" dirty="0" err="1">
-                <a:latin typeface="Helvetica"/>
-                <a:cs typeface="Helvetica"/>
-              </a:rPr>
-              <a:t>adipiscing</a:t>
-            </a:r>
-            <a:r>
-              <a:rPr lang="en-US" sz="3600" dirty="0">
-                <a:latin typeface="Helvetica"/>
-                <a:cs typeface="Helvetica"/>
-              </a:rPr>
-              <a:t> </a:t>
-            </a:r>
-            <a:r>
-              <a:rPr lang="en-US" sz="3600" dirty="0" err="1">
-                <a:latin typeface="Helvetica"/>
-                <a:cs typeface="Helvetica"/>
-              </a:rPr>
-              <a:t>elit</a:t>
-            </a:r>
-            <a:r>
-              <a:rPr lang="en-US" sz="3600" dirty="0">
-                <a:latin typeface="Helvetica"/>
-                <a:cs typeface="Helvetica"/>
-              </a:rPr>
-              <a:t>, </a:t>
-            </a:r>
-            <a:r>
-              <a:rPr lang="en-US" sz="3600" dirty="0" err="1">
-                <a:latin typeface="Helvetica"/>
-                <a:cs typeface="Helvetica"/>
-              </a:rPr>
-              <a:t>sed</a:t>
-            </a:r>
-            <a:r>
-              <a:rPr lang="en-US" sz="3600" dirty="0">
-                <a:latin typeface="Helvetica"/>
-                <a:cs typeface="Helvetica"/>
-              </a:rPr>
-              <a:t> do </a:t>
-            </a:r>
-            <a:r>
-              <a:rPr lang="en-US" sz="3600" dirty="0" err="1">
-                <a:latin typeface="Helvetica"/>
-                <a:cs typeface="Helvetica"/>
-              </a:rPr>
-              <a:t>eiusmod</a:t>
-            </a:r>
-            <a:r>
-              <a:rPr lang="en-US" sz="3600" dirty="0">
-                <a:latin typeface="Helvetica"/>
-                <a:cs typeface="Helvetica"/>
-              </a:rPr>
-              <a:t> </a:t>
-            </a:r>
-            <a:r>
-              <a:rPr lang="en-US" sz="3600" dirty="0" err="1">
-                <a:latin typeface="Helvetica"/>
-                <a:cs typeface="Helvetica"/>
-              </a:rPr>
-              <a:t>tempor</a:t>
-            </a:r>
-            <a:r>
-              <a:rPr lang="en-US" sz="3600" dirty="0">
-                <a:latin typeface="Helvetica"/>
-                <a:cs typeface="Helvetica"/>
-              </a:rPr>
-              <a:t> </a:t>
-            </a:r>
-            <a:endParaRPr lang="en-US" sz="3600" dirty="0" smtClean="0">
-              <a:latin typeface="Helvetica"/>
-              <a:cs typeface="Helvetica"/>
-            </a:endParaRPr>
-          </a:p>
-          <a:p>
-            <a:pPr marL="571500" indent="-571500">
-              <a:lnSpc>
-                <a:spcPct val="110000"/>
-              </a:lnSpc>
-              <a:buFont typeface="Arial"/>
-              <a:buChar char="•"/>
-            </a:pPr>
-            <a:r>
-              <a:rPr lang="en-US" sz="3600" dirty="0" err="1">
-                <a:latin typeface="Helvetica"/>
-                <a:cs typeface="Helvetica"/>
-              </a:rPr>
-              <a:t>adipiscing</a:t>
-            </a:r>
-            <a:r>
-              <a:rPr lang="en-US" sz="3600" dirty="0">
-                <a:latin typeface="Helvetica"/>
-                <a:cs typeface="Helvetica"/>
-              </a:rPr>
-              <a:t> </a:t>
-            </a:r>
-            <a:r>
-              <a:rPr lang="en-US" sz="3600" dirty="0" err="1">
-                <a:latin typeface="Helvetica"/>
-                <a:cs typeface="Helvetica"/>
-              </a:rPr>
-              <a:t>elit</a:t>
-            </a:r>
-            <a:r>
-              <a:rPr lang="en-US" sz="3600" dirty="0">
-                <a:latin typeface="Helvetica"/>
-                <a:cs typeface="Helvetica"/>
-              </a:rPr>
-              <a:t>, </a:t>
-            </a:r>
-            <a:r>
-              <a:rPr lang="en-US" sz="3600" dirty="0" err="1">
-                <a:latin typeface="Helvetica"/>
-                <a:cs typeface="Helvetica"/>
-              </a:rPr>
-              <a:t>sed</a:t>
-            </a:r>
-            <a:r>
-              <a:rPr lang="en-US" sz="3600" dirty="0">
-                <a:latin typeface="Helvetica"/>
-                <a:cs typeface="Helvetica"/>
-              </a:rPr>
-              <a:t> do </a:t>
-            </a:r>
-            <a:r>
-              <a:rPr lang="en-US" sz="3600" dirty="0" err="1">
-                <a:latin typeface="Helvetica"/>
-                <a:cs typeface="Helvetica"/>
-              </a:rPr>
-              <a:t>eiusmod</a:t>
-            </a:r>
-            <a:r>
-              <a:rPr lang="en-US" sz="3600" dirty="0">
-                <a:latin typeface="Helvetica"/>
-                <a:cs typeface="Helvetica"/>
-              </a:rPr>
-              <a:t> </a:t>
-            </a:r>
-            <a:r>
-              <a:rPr lang="en-US" sz="3600" dirty="0" err="1">
-                <a:latin typeface="Helvetica"/>
-                <a:cs typeface="Helvetica"/>
-              </a:rPr>
-              <a:t>tempor</a:t>
-            </a:r>
-            <a:r>
-              <a:rPr lang="en-US" sz="3600" dirty="0">
-                <a:latin typeface="Helvetica"/>
-                <a:cs typeface="Helvetica"/>
-              </a:rPr>
-              <a:t> </a:t>
-            </a:r>
-            <a:endParaRPr lang="en-US" sz="3600" dirty="0" smtClean="0">
-              <a:latin typeface="Helvetica"/>
-              <a:cs typeface="Helvetica"/>
-            </a:endParaRPr>
-          </a:p>
-        </p:txBody>
-      </p:sp>
-      <p:sp>
-        <p:nvSpPr>
           <p:cNvPr id="41" name="TextBox 40"/>
           <p:cNvSpPr txBox="1"/>
           <p:nvPr/>
@@ -6550,6 +5604,1291 @@
           </a:p>
         </p:txBody>
       </p:sp>
+      <p:sp>
+        <p:nvSpPr>
+          <p:cNvPr id="24" name="TextBox 23"/>
+          <p:cNvSpPr txBox="1"/>
+          <p:nvPr/>
+        </p:nvSpPr>
+        <p:spPr>
+          <a:xfrm>
+            <a:off x="24704492" y="6157108"/>
+            <a:ext cx="6553441" cy="8051354"/>
+          </a:xfrm>
+          <a:prstGeom prst="rect">
+            <a:avLst/>
+          </a:prstGeom>
+          <a:noFill/>
+          <a:ln w="28575" cmpd="sng">
+            <a:solidFill>
+              <a:schemeClr val="tx1"/>
+            </a:solidFill>
+          </a:ln>
+        </p:spPr>
+        <p:txBody>
+          <a:bodyPr wrap="square" lIns="329104" tIns="164551" rIns="329104" bIns="164551" rtlCol="0">
+            <a:spAutoFit/>
+          </a:bodyPr>
+          <a:lstStyle/>
+          <a:p>
+            <a:pPr>
+              <a:lnSpc>
+                <a:spcPct val="90000"/>
+              </a:lnSpc>
+            </a:pPr>
+            <a:r>
+              <a:rPr lang="en-US" sz="6000" b="1" dirty="0" smtClean="0">
+                <a:latin typeface="Helvetica"/>
+                <a:cs typeface="Helvetica"/>
+              </a:rPr>
+              <a:t>User Education</a:t>
+            </a:r>
+            <a:endParaRPr lang="en-US" sz="6000" b="1" dirty="0" smtClean="0">
+              <a:latin typeface="Helvetica"/>
+              <a:cs typeface="Helvetica"/>
+            </a:endParaRPr>
+          </a:p>
+          <a:p>
+            <a:pPr>
+              <a:lnSpc>
+                <a:spcPct val="90000"/>
+              </a:lnSpc>
+            </a:pPr>
+            <a:endParaRPr lang="en-US" sz="1400" dirty="0">
+              <a:latin typeface="Helvetica"/>
+              <a:cs typeface="Helvetica"/>
+            </a:endParaRPr>
+          </a:p>
+          <a:p>
+            <a:pPr>
+              <a:lnSpc>
+                <a:spcPct val="110000"/>
+              </a:lnSpc>
+            </a:pPr>
+            <a:r>
+              <a:rPr lang="en-US" sz="3600" dirty="0" err="1">
+                <a:latin typeface="Helvetica"/>
+                <a:cs typeface="Helvetica"/>
+              </a:rPr>
+              <a:t>Lorem</a:t>
+            </a:r>
+            <a:r>
+              <a:rPr lang="en-US" sz="3600" dirty="0">
+                <a:latin typeface="Helvetica"/>
+                <a:cs typeface="Helvetica"/>
+              </a:rPr>
+              <a:t> </a:t>
+            </a:r>
+            <a:r>
+              <a:rPr lang="en-US" sz="3600" dirty="0" err="1">
+                <a:latin typeface="Helvetica"/>
+                <a:cs typeface="Helvetica"/>
+              </a:rPr>
+              <a:t>ipsum</a:t>
+            </a:r>
+            <a:r>
+              <a:rPr lang="en-US" sz="3600" dirty="0">
+                <a:latin typeface="Helvetica"/>
+                <a:cs typeface="Helvetica"/>
+              </a:rPr>
+              <a:t> dolor sit </a:t>
+            </a:r>
+            <a:r>
+              <a:rPr lang="en-US" sz="3600" dirty="0" err="1">
+                <a:latin typeface="Helvetica"/>
+                <a:cs typeface="Helvetica"/>
+              </a:rPr>
+              <a:t>amet</a:t>
+            </a:r>
+            <a:r>
+              <a:rPr lang="en-US" sz="3600" dirty="0">
+                <a:latin typeface="Helvetica"/>
+                <a:cs typeface="Helvetica"/>
+              </a:rPr>
+              <a:t>, </a:t>
+            </a:r>
+            <a:r>
+              <a:rPr lang="en-US" sz="3600" dirty="0" err="1">
+                <a:latin typeface="Helvetica"/>
+                <a:cs typeface="Helvetica"/>
+              </a:rPr>
+              <a:t>consectetur</a:t>
+            </a:r>
+            <a:r>
+              <a:rPr lang="en-US" sz="3600" dirty="0">
+                <a:latin typeface="Helvetica"/>
+                <a:cs typeface="Helvetica"/>
+              </a:rPr>
+              <a:t> </a:t>
+            </a:r>
+            <a:r>
+              <a:rPr lang="en-US" sz="3600" dirty="0" err="1">
+                <a:latin typeface="Helvetica"/>
+                <a:cs typeface="Helvetica"/>
+              </a:rPr>
+              <a:t>adipiscing</a:t>
+            </a:r>
+            <a:r>
+              <a:rPr lang="en-US" sz="3600" dirty="0">
+                <a:latin typeface="Helvetica"/>
+                <a:cs typeface="Helvetica"/>
+              </a:rPr>
+              <a:t> </a:t>
+            </a:r>
+            <a:r>
+              <a:rPr lang="en-US" sz="3600" dirty="0" err="1">
+                <a:latin typeface="Helvetica"/>
+                <a:cs typeface="Helvetica"/>
+              </a:rPr>
+              <a:t>elit</a:t>
+            </a:r>
+            <a:r>
+              <a:rPr lang="en-US" sz="3600" dirty="0">
+                <a:latin typeface="Helvetica"/>
+                <a:cs typeface="Helvetica"/>
+              </a:rPr>
+              <a:t>, </a:t>
+            </a:r>
+            <a:r>
+              <a:rPr lang="en-US" sz="3600" dirty="0" err="1">
+                <a:latin typeface="Helvetica"/>
+                <a:cs typeface="Helvetica"/>
+              </a:rPr>
+              <a:t>sed</a:t>
+            </a:r>
+            <a:r>
+              <a:rPr lang="en-US" sz="3600" dirty="0">
+                <a:latin typeface="Helvetica"/>
+                <a:cs typeface="Helvetica"/>
+              </a:rPr>
+              <a:t> do </a:t>
+            </a:r>
+            <a:r>
+              <a:rPr lang="en-US" sz="3600" dirty="0" err="1">
+                <a:latin typeface="Helvetica"/>
+                <a:cs typeface="Helvetica"/>
+              </a:rPr>
+              <a:t>eiusmod</a:t>
+            </a:r>
+            <a:r>
+              <a:rPr lang="en-US" sz="3600" dirty="0">
+                <a:latin typeface="Helvetica"/>
+                <a:cs typeface="Helvetica"/>
+              </a:rPr>
+              <a:t> </a:t>
+            </a:r>
+            <a:r>
+              <a:rPr lang="en-US" sz="3600" dirty="0" err="1">
+                <a:latin typeface="Helvetica"/>
+                <a:cs typeface="Helvetica"/>
+              </a:rPr>
+              <a:t>tempor</a:t>
+            </a:r>
+            <a:r>
+              <a:rPr lang="en-US" sz="3600" dirty="0">
+                <a:latin typeface="Helvetica"/>
+                <a:cs typeface="Helvetica"/>
+              </a:rPr>
+              <a:t> </a:t>
+            </a:r>
+            <a:r>
+              <a:rPr lang="en-US" sz="3600" dirty="0" err="1">
+                <a:latin typeface="Helvetica"/>
+                <a:cs typeface="Helvetica"/>
+              </a:rPr>
+              <a:t>incididunt</a:t>
+            </a:r>
+            <a:r>
+              <a:rPr lang="en-US" sz="3600" dirty="0">
+                <a:latin typeface="Helvetica"/>
+                <a:cs typeface="Helvetica"/>
+              </a:rPr>
+              <a:t> </a:t>
+            </a:r>
+            <a:r>
+              <a:rPr lang="en-US" sz="3600" dirty="0" err="1">
+                <a:latin typeface="Helvetica"/>
+                <a:cs typeface="Helvetica"/>
+              </a:rPr>
+              <a:t>ut</a:t>
+            </a:r>
+            <a:r>
+              <a:rPr lang="en-US" sz="3600" dirty="0">
+                <a:latin typeface="Helvetica"/>
+                <a:cs typeface="Helvetica"/>
+              </a:rPr>
+              <a:t> </a:t>
+            </a:r>
+            <a:r>
+              <a:rPr lang="en-US" sz="3600" dirty="0" err="1">
+                <a:latin typeface="Helvetica"/>
+                <a:cs typeface="Helvetica"/>
+              </a:rPr>
+              <a:t>labore</a:t>
+            </a:r>
+            <a:r>
+              <a:rPr lang="en-US" sz="3600" dirty="0">
+                <a:latin typeface="Helvetica"/>
+                <a:cs typeface="Helvetica"/>
+              </a:rPr>
+              <a:t> et </a:t>
+            </a:r>
+            <a:r>
+              <a:rPr lang="en-US" sz="3600" dirty="0" err="1">
+                <a:latin typeface="Helvetica"/>
+                <a:cs typeface="Helvetica"/>
+              </a:rPr>
+              <a:t>dolore</a:t>
+            </a:r>
+            <a:r>
+              <a:rPr lang="en-US" sz="3600" dirty="0">
+                <a:latin typeface="Helvetica"/>
+                <a:cs typeface="Helvetica"/>
+              </a:rPr>
+              <a:t> magna </a:t>
+            </a:r>
+            <a:r>
+              <a:rPr lang="en-US" sz="3600" dirty="0" err="1" smtClean="0">
+                <a:latin typeface="Helvetica"/>
+                <a:cs typeface="Helvetica"/>
+              </a:rPr>
+              <a:t>aliqua</a:t>
+            </a:r>
+            <a:r>
+              <a:rPr lang="en-US" sz="3600" dirty="0" smtClean="0">
+                <a:latin typeface="Helvetica"/>
+                <a:cs typeface="Helvetica"/>
+              </a:rPr>
+              <a:t> </a:t>
+            </a:r>
+            <a:r>
+              <a:rPr lang="en-US" sz="3600" dirty="0">
+                <a:latin typeface="Helvetica"/>
+                <a:cs typeface="Helvetica"/>
+              </a:rPr>
+              <a:t>magna </a:t>
+            </a:r>
+            <a:r>
+              <a:rPr lang="en-US" sz="3600" dirty="0" err="1" smtClean="0">
+                <a:latin typeface="Helvetica"/>
+                <a:cs typeface="Helvetica"/>
+              </a:rPr>
+              <a:t>aliqua</a:t>
+            </a:r>
+            <a:r>
+              <a:rPr lang="en-US" sz="3600" dirty="0" smtClean="0">
+                <a:latin typeface="Helvetica"/>
+                <a:cs typeface="Helvetica"/>
+              </a:rPr>
+              <a:t> </a:t>
+            </a:r>
+            <a:r>
+              <a:rPr lang="en-US" sz="3600" dirty="0">
+                <a:latin typeface="Helvetica"/>
+                <a:cs typeface="Helvetica"/>
+              </a:rPr>
+              <a:t>magna </a:t>
+            </a:r>
+            <a:r>
+              <a:rPr lang="en-US" sz="3600" dirty="0" err="1" smtClean="0">
+                <a:latin typeface="Helvetica"/>
+                <a:cs typeface="Helvetica"/>
+              </a:rPr>
+              <a:t>aliqua</a:t>
+            </a:r>
+            <a:r>
+              <a:rPr lang="en-US" sz="3600" dirty="0" smtClean="0">
+                <a:latin typeface="Helvetica"/>
+                <a:cs typeface="Helvetica"/>
+              </a:rPr>
+              <a:t> </a:t>
+            </a:r>
+            <a:r>
+              <a:rPr lang="en-US" sz="3600" dirty="0">
+                <a:latin typeface="Helvetica"/>
+                <a:cs typeface="Helvetica"/>
+              </a:rPr>
+              <a:t>magna </a:t>
+            </a:r>
+            <a:r>
+              <a:rPr lang="en-US" sz="3600" dirty="0" err="1" smtClean="0">
+                <a:latin typeface="Helvetica"/>
+                <a:cs typeface="Helvetica"/>
+              </a:rPr>
+              <a:t>aliqua</a:t>
+            </a:r>
+            <a:r>
+              <a:rPr lang="en-US" sz="3600" dirty="0">
+                <a:latin typeface="Helvetica"/>
+                <a:cs typeface="Helvetica"/>
+              </a:rPr>
+              <a:t> </a:t>
+            </a:r>
+            <a:r>
+              <a:rPr lang="en-US" sz="3600" dirty="0" err="1">
+                <a:latin typeface="Helvetica"/>
+                <a:cs typeface="Helvetica"/>
+              </a:rPr>
+              <a:t>Lorem</a:t>
+            </a:r>
+            <a:r>
+              <a:rPr lang="en-US" sz="3600" dirty="0">
+                <a:latin typeface="Helvetica"/>
+                <a:cs typeface="Helvetica"/>
+              </a:rPr>
+              <a:t> </a:t>
+            </a:r>
+            <a:r>
+              <a:rPr lang="en-US" sz="3600" dirty="0" err="1">
+                <a:latin typeface="Helvetica"/>
+                <a:cs typeface="Helvetica"/>
+              </a:rPr>
+              <a:t>ipsum</a:t>
+            </a:r>
+            <a:r>
+              <a:rPr lang="en-US" sz="3600" dirty="0">
+                <a:latin typeface="Helvetica"/>
+                <a:cs typeface="Helvetica"/>
+              </a:rPr>
+              <a:t> dolor sit </a:t>
+            </a:r>
+            <a:r>
+              <a:rPr lang="en-US" sz="3600" dirty="0" err="1">
+                <a:latin typeface="Helvetica"/>
+                <a:cs typeface="Helvetica"/>
+              </a:rPr>
+              <a:t>amet</a:t>
+            </a:r>
+            <a:r>
+              <a:rPr lang="en-US" sz="3600" dirty="0">
+                <a:latin typeface="Helvetica"/>
+                <a:cs typeface="Helvetica"/>
+              </a:rPr>
+              <a:t>, </a:t>
+            </a:r>
+            <a:r>
+              <a:rPr lang="en-US" sz="3600" dirty="0" err="1">
+                <a:latin typeface="Helvetica"/>
+                <a:cs typeface="Helvetica"/>
+              </a:rPr>
+              <a:t>consectetur</a:t>
+            </a:r>
+            <a:r>
+              <a:rPr lang="en-US" sz="3600" dirty="0">
+                <a:latin typeface="Helvetica"/>
+                <a:cs typeface="Helvetica"/>
+              </a:rPr>
+              <a:t> </a:t>
+            </a:r>
+            <a:r>
+              <a:rPr lang="en-US" sz="3600" dirty="0" err="1">
+                <a:latin typeface="Helvetica"/>
+                <a:cs typeface="Helvetica"/>
+              </a:rPr>
+              <a:t>adipiscing</a:t>
+            </a:r>
+            <a:r>
+              <a:rPr lang="en-US" sz="3600" dirty="0">
+                <a:latin typeface="Helvetica"/>
+                <a:cs typeface="Helvetica"/>
+              </a:rPr>
+              <a:t> </a:t>
+            </a:r>
+            <a:r>
+              <a:rPr lang="en-US" sz="3600" dirty="0" err="1">
+                <a:latin typeface="Helvetica"/>
+                <a:cs typeface="Helvetica"/>
+              </a:rPr>
+              <a:t>elit</a:t>
+            </a:r>
+            <a:r>
+              <a:rPr lang="en-US" sz="3600" dirty="0">
+                <a:latin typeface="Helvetica"/>
+                <a:cs typeface="Helvetica"/>
+              </a:rPr>
+              <a:t>, </a:t>
+            </a:r>
+            <a:r>
+              <a:rPr lang="en-US" sz="3600" dirty="0" err="1">
+                <a:latin typeface="Helvetica"/>
+                <a:cs typeface="Helvetica"/>
+              </a:rPr>
+              <a:t>sed</a:t>
+            </a:r>
+            <a:r>
+              <a:rPr lang="en-US" sz="3600" dirty="0">
+                <a:latin typeface="Helvetica"/>
+                <a:cs typeface="Helvetica"/>
+              </a:rPr>
+              <a:t> do </a:t>
+            </a:r>
+            <a:r>
+              <a:rPr lang="en-US" sz="3600" dirty="0" err="1">
+                <a:latin typeface="Helvetica"/>
+                <a:cs typeface="Helvetica"/>
+              </a:rPr>
+              <a:t>eiusmod</a:t>
+            </a:r>
+            <a:r>
+              <a:rPr lang="en-US" sz="3600" dirty="0">
+                <a:latin typeface="Helvetica"/>
+                <a:cs typeface="Helvetica"/>
+              </a:rPr>
+              <a:t> </a:t>
+            </a:r>
+            <a:r>
+              <a:rPr lang="en-US" sz="3600" dirty="0" err="1">
+                <a:latin typeface="Helvetica"/>
+                <a:cs typeface="Helvetica"/>
+              </a:rPr>
+              <a:t>tempor</a:t>
+            </a:r>
+            <a:r>
+              <a:rPr lang="en-US" sz="3600" dirty="0">
+                <a:latin typeface="Helvetica"/>
+                <a:cs typeface="Helvetica"/>
+              </a:rPr>
+              <a:t> </a:t>
+            </a:r>
+            <a:r>
+              <a:rPr lang="en-US" sz="3600" dirty="0" err="1">
+                <a:latin typeface="Helvetica"/>
+                <a:cs typeface="Helvetica"/>
+              </a:rPr>
+              <a:t>incididunt</a:t>
+            </a:r>
+            <a:r>
+              <a:rPr lang="en-US" sz="3600" dirty="0">
+                <a:latin typeface="Helvetica"/>
+                <a:cs typeface="Helvetica"/>
+              </a:rPr>
+              <a:t> </a:t>
+            </a:r>
+            <a:r>
+              <a:rPr lang="en-US" sz="3600" dirty="0" err="1">
+                <a:latin typeface="Helvetica"/>
+                <a:cs typeface="Helvetica"/>
+              </a:rPr>
+              <a:t>ut</a:t>
+            </a:r>
+            <a:r>
+              <a:rPr lang="en-US" sz="3600" dirty="0">
+                <a:latin typeface="Helvetica"/>
+                <a:cs typeface="Helvetica"/>
+              </a:rPr>
+              <a:t> </a:t>
+            </a:r>
+            <a:r>
+              <a:rPr lang="en-US" sz="3600" dirty="0" err="1">
+                <a:latin typeface="Helvetica"/>
+                <a:cs typeface="Helvetica"/>
+              </a:rPr>
+              <a:t>labore</a:t>
+            </a:r>
+            <a:r>
+              <a:rPr lang="en-US" sz="3600" dirty="0">
+                <a:latin typeface="Helvetica"/>
+                <a:cs typeface="Helvetica"/>
+              </a:rPr>
+              <a:t> et </a:t>
+            </a:r>
+            <a:r>
+              <a:rPr lang="en-US" sz="3600" dirty="0" err="1">
+                <a:latin typeface="Helvetica"/>
+                <a:cs typeface="Helvetica"/>
+              </a:rPr>
+              <a:t>dolore</a:t>
+            </a:r>
+            <a:r>
+              <a:rPr lang="en-US" sz="3600" dirty="0">
+                <a:latin typeface="Helvetica"/>
+                <a:cs typeface="Helvetica"/>
+              </a:rPr>
+              <a:t> </a:t>
+            </a:r>
+            <a:r>
+              <a:rPr lang="en-US" sz="3600" dirty="0" err="1">
+                <a:latin typeface="Helvetica"/>
+                <a:cs typeface="Helvetica"/>
+              </a:rPr>
+              <a:t>sed</a:t>
+            </a:r>
+            <a:r>
+              <a:rPr lang="en-US" sz="3600" dirty="0">
+                <a:latin typeface="Helvetica"/>
+                <a:cs typeface="Helvetica"/>
+              </a:rPr>
+              <a:t> do </a:t>
+            </a:r>
+            <a:r>
+              <a:rPr lang="en-US" sz="3600" dirty="0" err="1">
+                <a:latin typeface="Helvetica"/>
+                <a:cs typeface="Helvetica"/>
+              </a:rPr>
+              <a:t>eiusmod</a:t>
+            </a:r>
+            <a:r>
+              <a:rPr lang="en-US" sz="3600" dirty="0">
+                <a:latin typeface="Helvetica"/>
+                <a:cs typeface="Helvetica"/>
+              </a:rPr>
+              <a:t> </a:t>
+            </a:r>
+            <a:r>
+              <a:rPr lang="en-US" sz="3600" dirty="0" err="1" smtClean="0">
+                <a:latin typeface="Helvetica"/>
+                <a:cs typeface="Helvetica"/>
+              </a:rPr>
+              <a:t>tempor</a:t>
+            </a:r>
+            <a:endParaRPr lang="en-US" sz="3600" dirty="0">
+              <a:latin typeface="Helvetica"/>
+              <a:cs typeface="Helvetica"/>
+            </a:endParaRPr>
+          </a:p>
+        </p:txBody>
+      </p:sp>
+      <p:sp>
+        <p:nvSpPr>
+          <p:cNvPr id="28" name="TextBox 27"/>
+          <p:cNvSpPr txBox="1"/>
+          <p:nvPr/>
+        </p:nvSpPr>
+        <p:spPr>
+          <a:xfrm>
+            <a:off x="10985500" y="20567153"/>
+            <a:ext cx="5764532" cy="4394966"/>
+          </a:xfrm>
+          <a:prstGeom prst="rect">
+            <a:avLst/>
+          </a:prstGeom>
+          <a:noFill/>
+          <a:ln w="28575" cmpd="sng">
+            <a:solidFill>
+              <a:schemeClr val="tx1"/>
+            </a:solidFill>
+          </a:ln>
+        </p:spPr>
+        <p:txBody>
+          <a:bodyPr wrap="square" lIns="329104" tIns="164551" rIns="329104" bIns="164551" rtlCol="0">
+            <a:spAutoFit/>
+          </a:bodyPr>
+          <a:lstStyle/>
+          <a:p>
+            <a:pPr>
+              <a:lnSpc>
+                <a:spcPct val="90000"/>
+              </a:lnSpc>
+            </a:pPr>
+            <a:r>
+              <a:rPr lang="en-US" sz="6000" b="1" dirty="0" smtClean="0">
+                <a:latin typeface="Helvetica"/>
+                <a:cs typeface="Helvetica"/>
+              </a:rPr>
+              <a:t>Advantages</a:t>
+            </a:r>
+          </a:p>
+          <a:p>
+            <a:pPr>
+              <a:lnSpc>
+                <a:spcPct val="90000"/>
+              </a:lnSpc>
+            </a:pPr>
+            <a:endParaRPr lang="en-US" sz="1400" dirty="0">
+              <a:latin typeface="Helvetica"/>
+              <a:cs typeface="Helvetica"/>
+            </a:endParaRPr>
+          </a:p>
+          <a:p>
+            <a:pPr marL="571500" indent="-571500">
+              <a:lnSpc>
+                <a:spcPct val="110000"/>
+              </a:lnSpc>
+              <a:buFont typeface="Arial"/>
+              <a:buChar char="•"/>
+            </a:pPr>
+            <a:r>
+              <a:rPr lang="en-US" sz="3600" dirty="0" err="1">
+                <a:latin typeface="Helvetica"/>
+                <a:cs typeface="Helvetica"/>
+              </a:rPr>
+              <a:t>adipiscing</a:t>
+            </a:r>
+            <a:r>
+              <a:rPr lang="en-US" sz="3600" dirty="0">
+                <a:latin typeface="Helvetica"/>
+                <a:cs typeface="Helvetica"/>
+              </a:rPr>
+              <a:t> </a:t>
+            </a:r>
+            <a:r>
+              <a:rPr lang="en-US" sz="3600" dirty="0" err="1">
+                <a:latin typeface="Helvetica"/>
+                <a:cs typeface="Helvetica"/>
+              </a:rPr>
+              <a:t>elit</a:t>
+            </a:r>
+            <a:r>
+              <a:rPr lang="en-US" sz="3600" dirty="0">
+                <a:latin typeface="Helvetica"/>
+                <a:cs typeface="Helvetica"/>
+              </a:rPr>
+              <a:t>, </a:t>
+            </a:r>
+            <a:r>
+              <a:rPr lang="en-US" sz="3600" dirty="0" err="1">
+                <a:latin typeface="Helvetica"/>
+                <a:cs typeface="Helvetica"/>
+              </a:rPr>
+              <a:t>sed</a:t>
+            </a:r>
+            <a:r>
+              <a:rPr lang="en-US" sz="3600" dirty="0">
+                <a:latin typeface="Helvetica"/>
+                <a:cs typeface="Helvetica"/>
+              </a:rPr>
+              <a:t> </a:t>
+            </a:r>
+            <a:r>
+              <a:rPr lang="en-US" sz="3600" dirty="0" smtClean="0">
+                <a:latin typeface="Helvetica"/>
+                <a:cs typeface="Helvetica"/>
+              </a:rPr>
+              <a:t>do</a:t>
+            </a:r>
+          </a:p>
+          <a:p>
+            <a:pPr marL="571500" indent="-571500">
+              <a:lnSpc>
+                <a:spcPct val="110000"/>
+              </a:lnSpc>
+              <a:buFont typeface="Arial"/>
+              <a:buChar char="•"/>
+            </a:pPr>
+            <a:r>
+              <a:rPr lang="en-US" sz="3600" dirty="0" err="1">
+                <a:latin typeface="Helvetica"/>
+                <a:cs typeface="Helvetica"/>
+              </a:rPr>
+              <a:t>adipiscing</a:t>
+            </a:r>
+            <a:r>
+              <a:rPr lang="en-US" sz="3600" dirty="0">
+                <a:latin typeface="Helvetica"/>
+                <a:cs typeface="Helvetica"/>
+              </a:rPr>
+              <a:t> </a:t>
+            </a:r>
+            <a:r>
+              <a:rPr lang="en-US" sz="3600" dirty="0" err="1">
+                <a:latin typeface="Helvetica"/>
+                <a:cs typeface="Helvetica"/>
+              </a:rPr>
+              <a:t>elit</a:t>
+            </a:r>
+            <a:r>
+              <a:rPr lang="en-US" sz="3600" dirty="0">
+                <a:latin typeface="Helvetica"/>
+                <a:cs typeface="Helvetica"/>
+              </a:rPr>
+              <a:t>, </a:t>
+            </a:r>
+            <a:r>
+              <a:rPr lang="en-US" sz="3600" dirty="0" err="1">
+                <a:latin typeface="Helvetica"/>
+                <a:cs typeface="Helvetica"/>
+              </a:rPr>
+              <a:t>sed</a:t>
+            </a:r>
+            <a:r>
+              <a:rPr lang="en-US" sz="3600" dirty="0">
+                <a:latin typeface="Helvetica"/>
+                <a:cs typeface="Helvetica"/>
+              </a:rPr>
+              <a:t> do</a:t>
+            </a:r>
+          </a:p>
+          <a:p>
+            <a:pPr marL="571500" indent="-571500">
+              <a:lnSpc>
+                <a:spcPct val="110000"/>
+              </a:lnSpc>
+              <a:buFont typeface="Arial"/>
+              <a:buChar char="•"/>
+            </a:pPr>
+            <a:r>
+              <a:rPr lang="en-US" sz="3600" dirty="0" err="1">
+                <a:latin typeface="Helvetica"/>
+                <a:cs typeface="Helvetica"/>
+              </a:rPr>
+              <a:t>adipiscing</a:t>
+            </a:r>
+            <a:r>
+              <a:rPr lang="en-US" sz="3600" dirty="0">
+                <a:latin typeface="Helvetica"/>
+                <a:cs typeface="Helvetica"/>
+              </a:rPr>
+              <a:t> </a:t>
+            </a:r>
+            <a:r>
+              <a:rPr lang="en-US" sz="3600" dirty="0" err="1">
+                <a:latin typeface="Helvetica"/>
+                <a:cs typeface="Helvetica"/>
+              </a:rPr>
+              <a:t>elit</a:t>
+            </a:r>
+            <a:r>
+              <a:rPr lang="en-US" sz="3600" dirty="0">
+                <a:latin typeface="Helvetica"/>
+                <a:cs typeface="Helvetica"/>
+              </a:rPr>
+              <a:t>, </a:t>
+            </a:r>
+            <a:r>
+              <a:rPr lang="en-US" sz="3600" dirty="0" err="1">
+                <a:latin typeface="Helvetica"/>
+                <a:cs typeface="Helvetica"/>
+              </a:rPr>
+              <a:t>sed</a:t>
+            </a:r>
+            <a:r>
+              <a:rPr lang="en-US" sz="3600" dirty="0">
+                <a:latin typeface="Helvetica"/>
+                <a:cs typeface="Helvetica"/>
+              </a:rPr>
+              <a:t> do</a:t>
+            </a:r>
+          </a:p>
+          <a:p>
+            <a:pPr marL="571500" indent="-571500">
+              <a:lnSpc>
+                <a:spcPct val="110000"/>
+              </a:lnSpc>
+              <a:buFont typeface="Arial"/>
+              <a:buChar char="•"/>
+            </a:pPr>
+            <a:r>
+              <a:rPr lang="en-US" sz="3600" dirty="0" err="1">
+                <a:latin typeface="Helvetica"/>
+                <a:cs typeface="Helvetica"/>
+              </a:rPr>
+              <a:t>adipiscing</a:t>
+            </a:r>
+            <a:r>
+              <a:rPr lang="en-US" sz="3600" dirty="0">
+                <a:latin typeface="Helvetica"/>
+                <a:cs typeface="Helvetica"/>
+              </a:rPr>
+              <a:t> </a:t>
+            </a:r>
+            <a:r>
+              <a:rPr lang="en-US" sz="3600" dirty="0" err="1">
+                <a:latin typeface="Helvetica"/>
+                <a:cs typeface="Helvetica"/>
+              </a:rPr>
+              <a:t>elit</a:t>
+            </a:r>
+            <a:r>
+              <a:rPr lang="en-US" sz="3600" dirty="0">
+                <a:latin typeface="Helvetica"/>
+                <a:cs typeface="Helvetica"/>
+              </a:rPr>
+              <a:t>, </a:t>
+            </a:r>
+            <a:r>
+              <a:rPr lang="en-US" sz="3600" dirty="0" err="1">
+                <a:latin typeface="Helvetica"/>
+                <a:cs typeface="Helvetica"/>
+              </a:rPr>
+              <a:t>sed</a:t>
+            </a:r>
+            <a:r>
+              <a:rPr lang="en-US" sz="3600" dirty="0">
+                <a:latin typeface="Helvetica"/>
+                <a:cs typeface="Helvetica"/>
+              </a:rPr>
+              <a:t> </a:t>
+            </a:r>
+            <a:r>
+              <a:rPr lang="en-US" sz="3600" dirty="0" smtClean="0">
+                <a:latin typeface="Helvetica"/>
+                <a:cs typeface="Helvetica"/>
+              </a:rPr>
+              <a:t>do</a:t>
+            </a:r>
+            <a:endParaRPr lang="en-US" sz="3600" dirty="0">
+              <a:latin typeface="Helvetica"/>
+              <a:cs typeface="Helvetica"/>
+            </a:endParaRPr>
+          </a:p>
+          <a:p>
+            <a:pPr marL="571500" indent="-571500">
+              <a:lnSpc>
+                <a:spcPct val="110000"/>
+              </a:lnSpc>
+              <a:buFont typeface="Arial"/>
+              <a:buChar char="•"/>
+            </a:pPr>
+            <a:r>
+              <a:rPr lang="en-US" sz="3600" dirty="0" err="1">
+                <a:latin typeface="Helvetica"/>
+                <a:cs typeface="Helvetica"/>
+              </a:rPr>
+              <a:t>adipiscing</a:t>
+            </a:r>
+            <a:r>
+              <a:rPr lang="en-US" sz="3600" dirty="0">
+                <a:latin typeface="Helvetica"/>
+                <a:cs typeface="Helvetica"/>
+              </a:rPr>
+              <a:t> </a:t>
+            </a:r>
+            <a:r>
+              <a:rPr lang="en-US" sz="3600" dirty="0" err="1">
+                <a:latin typeface="Helvetica"/>
+                <a:cs typeface="Helvetica"/>
+              </a:rPr>
+              <a:t>elit</a:t>
+            </a:r>
+            <a:r>
+              <a:rPr lang="en-US" sz="3600" dirty="0">
+                <a:latin typeface="Helvetica"/>
+                <a:cs typeface="Helvetica"/>
+              </a:rPr>
+              <a:t>, </a:t>
+            </a:r>
+            <a:r>
+              <a:rPr lang="en-US" sz="3600" dirty="0" err="1">
+                <a:latin typeface="Helvetica"/>
+                <a:cs typeface="Helvetica"/>
+              </a:rPr>
+              <a:t>sed</a:t>
+            </a:r>
+            <a:r>
+              <a:rPr lang="en-US" sz="3600" dirty="0">
+                <a:latin typeface="Helvetica"/>
+                <a:cs typeface="Helvetica"/>
+              </a:rPr>
+              <a:t> do</a:t>
+            </a:r>
+          </a:p>
+        </p:txBody>
+      </p:sp>
+      <p:sp>
+        <p:nvSpPr>
+          <p:cNvPr id="31" name="TextBox 30"/>
+          <p:cNvSpPr txBox="1"/>
+          <p:nvPr/>
+        </p:nvSpPr>
+        <p:spPr>
+          <a:xfrm>
+            <a:off x="17321489" y="20639715"/>
+            <a:ext cx="5764532" cy="4394966"/>
+          </a:xfrm>
+          <a:prstGeom prst="rect">
+            <a:avLst/>
+          </a:prstGeom>
+          <a:noFill/>
+          <a:ln w="28575" cmpd="sng">
+            <a:solidFill>
+              <a:schemeClr val="tx1"/>
+            </a:solidFill>
+          </a:ln>
+        </p:spPr>
+        <p:txBody>
+          <a:bodyPr wrap="square" lIns="329104" tIns="164551" rIns="329104" bIns="164551" rtlCol="0">
+            <a:spAutoFit/>
+          </a:bodyPr>
+          <a:lstStyle/>
+          <a:p>
+            <a:pPr>
+              <a:lnSpc>
+                <a:spcPct val="90000"/>
+              </a:lnSpc>
+            </a:pPr>
+            <a:r>
+              <a:rPr lang="en-US" sz="6000" b="1" dirty="0" err="1" smtClean="0">
+                <a:latin typeface="Helvetica"/>
+                <a:cs typeface="Helvetica"/>
+              </a:rPr>
+              <a:t>Disdvantages</a:t>
+            </a:r>
+            <a:endParaRPr lang="en-US" sz="6000" b="1" dirty="0" smtClean="0">
+              <a:latin typeface="Helvetica"/>
+              <a:cs typeface="Helvetica"/>
+            </a:endParaRPr>
+          </a:p>
+          <a:p>
+            <a:pPr>
+              <a:lnSpc>
+                <a:spcPct val="90000"/>
+              </a:lnSpc>
+            </a:pPr>
+            <a:endParaRPr lang="en-US" sz="1400" dirty="0">
+              <a:latin typeface="Helvetica"/>
+              <a:cs typeface="Helvetica"/>
+            </a:endParaRPr>
+          </a:p>
+          <a:p>
+            <a:pPr marL="571500" indent="-571500">
+              <a:lnSpc>
+                <a:spcPct val="110000"/>
+              </a:lnSpc>
+              <a:buFont typeface="Arial"/>
+              <a:buChar char="•"/>
+            </a:pPr>
+            <a:r>
+              <a:rPr lang="en-US" sz="3600" dirty="0" err="1">
+                <a:latin typeface="Helvetica"/>
+                <a:cs typeface="Helvetica"/>
+              </a:rPr>
+              <a:t>adipiscing</a:t>
+            </a:r>
+            <a:r>
+              <a:rPr lang="en-US" sz="3600" dirty="0">
+                <a:latin typeface="Helvetica"/>
+                <a:cs typeface="Helvetica"/>
+              </a:rPr>
+              <a:t> </a:t>
+            </a:r>
+            <a:r>
+              <a:rPr lang="en-US" sz="3600" dirty="0" err="1">
+                <a:latin typeface="Helvetica"/>
+                <a:cs typeface="Helvetica"/>
+              </a:rPr>
+              <a:t>elit</a:t>
+            </a:r>
+            <a:r>
+              <a:rPr lang="en-US" sz="3600" dirty="0">
+                <a:latin typeface="Helvetica"/>
+                <a:cs typeface="Helvetica"/>
+              </a:rPr>
+              <a:t>, </a:t>
+            </a:r>
+            <a:r>
+              <a:rPr lang="en-US" sz="3600" dirty="0" err="1">
+                <a:latin typeface="Helvetica"/>
+                <a:cs typeface="Helvetica"/>
+              </a:rPr>
+              <a:t>sed</a:t>
+            </a:r>
+            <a:r>
+              <a:rPr lang="en-US" sz="3600" dirty="0">
+                <a:latin typeface="Helvetica"/>
+                <a:cs typeface="Helvetica"/>
+              </a:rPr>
+              <a:t> </a:t>
+            </a:r>
+            <a:r>
+              <a:rPr lang="en-US" sz="3600" dirty="0" smtClean="0">
+                <a:latin typeface="Helvetica"/>
+                <a:cs typeface="Helvetica"/>
+              </a:rPr>
+              <a:t>do</a:t>
+            </a:r>
+          </a:p>
+          <a:p>
+            <a:pPr marL="571500" indent="-571500">
+              <a:lnSpc>
+                <a:spcPct val="110000"/>
+              </a:lnSpc>
+              <a:buFont typeface="Arial"/>
+              <a:buChar char="•"/>
+            </a:pPr>
+            <a:r>
+              <a:rPr lang="en-US" sz="3600" dirty="0" err="1">
+                <a:latin typeface="Helvetica"/>
+                <a:cs typeface="Helvetica"/>
+              </a:rPr>
+              <a:t>adipiscing</a:t>
+            </a:r>
+            <a:r>
+              <a:rPr lang="en-US" sz="3600" dirty="0">
+                <a:latin typeface="Helvetica"/>
+                <a:cs typeface="Helvetica"/>
+              </a:rPr>
+              <a:t> </a:t>
+            </a:r>
+            <a:r>
+              <a:rPr lang="en-US" sz="3600" dirty="0" err="1">
+                <a:latin typeface="Helvetica"/>
+                <a:cs typeface="Helvetica"/>
+              </a:rPr>
+              <a:t>elit</a:t>
+            </a:r>
+            <a:r>
+              <a:rPr lang="en-US" sz="3600" dirty="0">
+                <a:latin typeface="Helvetica"/>
+                <a:cs typeface="Helvetica"/>
+              </a:rPr>
+              <a:t>, </a:t>
+            </a:r>
+            <a:r>
+              <a:rPr lang="en-US" sz="3600" dirty="0" err="1">
+                <a:latin typeface="Helvetica"/>
+                <a:cs typeface="Helvetica"/>
+              </a:rPr>
+              <a:t>sed</a:t>
+            </a:r>
+            <a:r>
+              <a:rPr lang="en-US" sz="3600" dirty="0">
+                <a:latin typeface="Helvetica"/>
+                <a:cs typeface="Helvetica"/>
+              </a:rPr>
+              <a:t> do</a:t>
+            </a:r>
+          </a:p>
+          <a:p>
+            <a:pPr marL="571500" indent="-571500">
+              <a:lnSpc>
+                <a:spcPct val="110000"/>
+              </a:lnSpc>
+              <a:buFont typeface="Arial"/>
+              <a:buChar char="•"/>
+            </a:pPr>
+            <a:r>
+              <a:rPr lang="en-US" sz="3600" dirty="0" err="1">
+                <a:latin typeface="Helvetica"/>
+                <a:cs typeface="Helvetica"/>
+              </a:rPr>
+              <a:t>adipiscing</a:t>
+            </a:r>
+            <a:r>
+              <a:rPr lang="en-US" sz="3600" dirty="0">
+                <a:latin typeface="Helvetica"/>
+                <a:cs typeface="Helvetica"/>
+              </a:rPr>
+              <a:t> </a:t>
+            </a:r>
+            <a:r>
+              <a:rPr lang="en-US" sz="3600" dirty="0" err="1">
+                <a:latin typeface="Helvetica"/>
+                <a:cs typeface="Helvetica"/>
+              </a:rPr>
+              <a:t>elit</a:t>
+            </a:r>
+            <a:r>
+              <a:rPr lang="en-US" sz="3600" dirty="0">
+                <a:latin typeface="Helvetica"/>
+                <a:cs typeface="Helvetica"/>
+              </a:rPr>
+              <a:t>, </a:t>
+            </a:r>
+            <a:r>
+              <a:rPr lang="en-US" sz="3600" dirty="0" err="1">
+                <a:latin typeface="Helvetica"/>
+                <a:cs typeface="Helvetica"/>
+              </a:rPr>
+              <a:t>sed</a:t>
+            </a:r>
+            <a:r>
+              <a:rPr lang="en-US" sz="3600" dirty="0">
+                <a:latin typeface="Helvetica"/>
+                <a:cs typeface="Helvetica"/>
+              </a:rPr>
+              <a:t> do</a:t>
+            </a:r>
+          </a:p>
+          <a:p>
+            <a:pPr marL="571500" indent="-571500">
+              <a:lnSpc>
+                <a:spcPct val="110000"/>
+              </a:lnSpc>
+              <a:buFont typeface="Arial"/>
+              <a:buChar char="•"/>
+            </a:pPr>
+            <a:r>
+              <a:rPr lang="en-US" sz="3600" dirty="0" err="1">
+                <a:latin typeface="Helvetica"/>
+                <a:cs typeface="Helvetica"/>
+              </a:rPr>
+              <a:t>adipiscing</a:t>
+            </a:r>
+            <a:r>
+              <a:rPr lang="en-US" sz="3600" dirty="0">
+                <a:latin typeface="Helvetica"/>
+                <a:cs typeface="Helvetica"/>
+              </a:rPr>
+              <a:t> </a:t>
+            </a:r>
+            <a:r>
+              <a:rPr lang="en-US" sz="3600" dirty="0" err="1">
+                <a:latin typeface="Helvetica"/>
+                <a:cs typeface="Helvetica"/>
+              </a:rPr>
+              <a:t>elit</a:t>
+            </a:r>
+            <a:r>
+              <a:rPr lang="en-US" sz="3600" dirty="0">
+                <a:latin typeface="Helvetica"/>
+                <a:cs typeface="Helvetica"/>
+              </a:rPr>
+              <a:t>, </a:t>
+            </a:r>
+            <a:r>
+              <a:rPr lang="en-US" sz="3600" dirty="0" err="1">
+                <a:latin typeface="Helvetica"/>
+                <a:cs typeface="Helvetica"/>
+              </a:rPr>
+              <a:t>sed</a:t>
+            </a:r>
+            <a:r>
+              <a:rPr lang="en-US" sz="3600" dirty="0">
+                <a:latin typeface="Helvetica"/>
+                <a:cs typeface="Helvetica"/>
+              </a:rPr>
+              <a:t> </a:t>
+            </a:r>
+            <a:r>
+              <a:rPr lang="en-US" sz="3600" dirty="0" smtClean="0">
+                <a:latin typeface="Helvetica"/>
+                <a:cs typeface="Helvetica"/>
+              </a:rPr>
+              <a:t>do</a:t>
+            </a:r>
+          </a:p>
+          <a:p>
+            <a:pPr marL="571500" indent="-571500">
+              <a:lnSpc>
+                <a:spcPct val="110000"/>
+              </a:lnSpc>
+              <a:buFont typeface="Arial"/>
+              <a:buChar char="•"/>
+            </a:pPr>
+            <a:r>
+              <a:rPr lang="en-US" sz="3600" dirty="0" err="1">
+                <a:latin typeface="Helvetica"/>
+                <a:cs typeface="Helvetica"/>
+              </a:rPr>
+              <a:t>adipiscing</a:t>
+            </a:r>
+            <a:r>
+              <a:rPr lang="en-US" sz="3600" dirty="0">
+                <a:latin typeface="Helvetica"/>
+                <a:cs typeface="Helvetica"/>
+              </a:rPr>
+              <a:t> </a:t>
+            </a:r>
+            <a:r>
+              <a:rPr lang="en-US" sz="3600" dirty="0" err="1">
+                <a:latin typeface="Helvetica"/>
+                <a:cs typeface="Helvetica"/>
+              </a:rPr>
+              <a:t>elit</a:t>
+            </a:r>
+            <a:r>
+              <a:rPr lang="en-US" sz="3600" dirty="0">
+                <a:latin typeface="Helvetica"/>
+                <a:cs typeface="Helvetica"/>
+              </a:rPr>
+              <a:t>, </a:t>
+            </a:r>
+            <a:r>
+              <a:rPr lang="en-US" sz="3600" dirty="0" err="1">
+                <a:latin typeface="Helvetica"/>
+                <a:cs typeface="Helvetica"/>
+              </a:rPr>
+              <a:t>sed</a:t>
+            </a:r>
+            <a:r>
+              <a:rPr lang="en-US" sz="3600" dirty="0">
+                <a:latin typeface="Helvetica"/>
+                <a:cs typeface="Helvetica"/>
+              </a:rPr>
+              <a:t> </a:t>
+            </a:r>
+            <a:r>
+              <a:rPr lang="en-US" sz="3600" dirty="0" smtClean="0">
+                <a:latin typeface="Helvetica"/>
+                <a:cs typeface="Helvetica"/>
+              </a:rPr>
+              <a:t>do</a:t>
+            </a:r>
+            <a:endParaRPr lang="en-US" sz="3600" dirty="0">
+              <a:latin typeface="Helvetica"/>
+              <a:cs typeface="Helvetica"/>
+            </a:endParaRPr>
+          </a:p>
+        </p:txBody>
+      </p:sp>
+      <p:sp>
+        <p:nvSpPr>
+          <p:cNvPr id="33" name="Rectangle 32"/>
+          <p:cNvSpPr/>
+          <p:nvPr/>
+        </p:nvSpPr>
+        <p:spPr>
+          <a:xfrm rot="5400000">
+            <a:off x="27758102" y="10593021"/>
+            <a:ext cx="651712" cy="8449676"/>
+          </a:xfrm>
+          <a:prstGeom prst="rect">
+            <a:avLst/>
+          </a:prstGeom>
+          <a:solidFill>
+            <a:srgbClr val="1C2939"/>
+          </a:solidFill>
+          <a:ln>
+            <a:noFill/>
+          </a:ln>
+          <a:effectLst/>
+        </p:spPr>
+        <p:style>
+          <a:lnRef idx="1">
+            <a:schemeClr val="accent1"/>
+          </a:lnRef>
+          <a:fillRef idx="3">
+            <a:schemeClr val="accent1"/>
+          </a:fillRef>
+          <a:effectRef idx="2">
+            <a:schemeClr val="accent1"/>
+          </a:effectRef>
+          <a:fontRef idx="minor">
+            <a:schemeClr val="lt1"/>
+          </a:fontRef>
+        </p:style>
+        <p:txBody>
+          <a:bodyPr lIns="329104" tIns="164551" rIns="329104" bIns="164551" rtlCol="0" anchor="ctr"/>
+          <a:lstStyle/>
+          <a:p>
+            <a:pPr algn="ctr"/>
+            <a:endParaRPr lang="en-US">
+              <a:latin typeface="Helvetica"/>
+              <a:cs typeface="Helvetica"/>
+            </a:endParaRPr>
+          </a:p>
+        </p:txBody>
+      </p:sp>
+      <p:pic>
+        <p:nvPicPr>
+          <p:cNvPr id="3" name="Picture 2" descr="fullpagelarge.png"/>
+          <p:cNvPicPr>
+            <a:picLocks noChangeAspect="1"/>
+          </p:cNvPicPr>
+          <p:nvPr/>
+        </p:nvPicPr>
+        <p:blipFill>
+          <a:blip r:embed="rId6">
+            <a:extLst>
+              <a:ext uri="{28A0092B-C50C-407E-A947-70E740481C1C}">
+                <a14:useLocalDpi xmlns:a14="http://schemas.microsoft.com/office/drawing/2010/main" val="0"/>
+              </a:ext>
+            </a:extLst>
+          </a:blip>
+          <a:stretch>
+            <a:fillRect/>
+          </a:stretch>
+        </p:blipFill>
+        <p:spPr>
+          <a:xfrm>
+            <a:off x="965199" y="15394117"/>
+            <a:ext cx="9022169" cy="9568001"/>
+          </a:xfrm>
+          <a:prstGeom prst="rect">
+            <a:avLst/>
+          </a:prstGeom>
+        </p:spPr>
+      </p:pic>
     </p:spTree>
     <p:extLst>
       <p:ext uri="{BB962C8B-B14F-4D97-AF65-F5344CB8AC3E}">
@@ -6886,7 +7225,7 @@
         <p:spPr>
           <a:xfrm>
             <a:off x="1" y="11762939"/>
-            <a:ext cx="5548473" cy="4135362"/>
+            <a:ext cx="5548473" cy="4827859"/>
           </a:xfrm>
           <a:prstGeom prst="rect">
             <a:avLst/>
@@ -6931,16 +7270,32 @@
           </a:p>
           <a:p>
             <a:r>
-              <a:rPr lang="en-US" sz="3600" dirty="0">
-                <a:latin typeface="Garamond"/>
-                <a:cs typeface="Garamond"/>
-              </a:rPr>
-              <a:t>Body Text</a:t>
-            </a:r>
-            <a:endParaRPr lang="en-US" sz="3600" dirty="0">
+              <a:rPr lang="en-US" sz="4500" b="1" dirty="0" smtClean="0">
+                <a:latin typeface="Helvetica"/>
+                <a:cs typeface="Helvetica"/>
+              </a:rPr>
+              <a:t>Heading</a:t>
+            </a:r>
+            <a:endParaRPr lang="en-US" sz="4500" dirty="0" smtClean="0">
               <a:latin typeface="Garamond"/>
               <a:cs typeface="Garamond"/>
             </a:endParaRPr>
+          </a:p>
+          <a:p>
+            <a:r>
+              <a:rPr lang="en-US" sz="3600" dirty="0" smtClean="0">
+                <a:latin typeface="Garamond"/>
+                <a:cs typeface="Garamond"/>
+              </a:rPr>
+              <a:t>Body </a:t>
+            </a:r>
+            <a:r>
+              <a:rPr lang="en-US" sz="3600" dirty="0">
+                <a:latin typeface="Garamond"/>
+                <a:cs typeface="Garamond"/>
+              </a:rPr>
+              <a:t>Text</a:t>
+            </a:r>
           </a:p>
         </p:txBody>
       </p:sp>

</xml_diff>